<commit_message>
first bootstrap pif working
</commit_message>
<xml_diff>
--- a/pptx/logo.pptx
+++ b/pptx/logo.pptx
@@ -104,6 +104,11 @@
       </a:defRPr>
     </a:lvl9pPr>
   </p:defaultTextStyle>
+  <p:extLst>
+    <p:ext uri="{EFAFB233-063F-42B5-8137-9DF3F51BA10A}">
+      <p15:sldGuideLst xmlns:p15="http://schemas.microsoft.com/office/powerpoint/2012/main"/>
+    </p:ext>
+  </p:extLst>
 </p:presentation>
 </file>
 
@@ -256,7 +261,7 @@
           <a:p>
             <a:fld id="{0C661D9C-BB46-1B48-82D6-116B0F1A2A7E}" type="datetimeFigureOut">
               <a:rPr lang="en-MX" smtClean="0"/>
-              <a:t>17/08/23</a:t>
+              <a:t>18/08/23</a:t>
             </a:fld>
             <a:endParaRPr lang="en-MX"/>
           </a:p>
@@ -456,7 +461,7 @@
           <a:p>
             <a:fld id="{0C661D9C-BB46-1B48-82D6-116B0F1A2A7E}" type="datetimeFigureOut">
               <a:rPr lang="en-MX" smtClean="0"/>
-              <a:t>17/08/23</a:t>
+              <a:t>18/08/23</a:t>
             </a:fld>
             <a:endParaRPr lang="en-MX"/>
           </a:p>
@@ -666,7 +671,7 @@
           <a:p>
             <a:fld id="{0C661D9C-BB46-1B48-82D6-116B0F1A2A7E}" type="datetimeFigureOut">
               <a:rPr lang="en-MX" smtClean="0"/>
-              <a:t>17/08/23</a:t>
+              <a:t>18/08/23</a:t>
             </a:fld>
             <a:endParaRPr lang="en-MX"/>
           </a:p>
@@ -866,7 +871,7 @@
           <a:p>
             <a:fld id="{0C661D9C-BB46-1B48-82D6-116B0F1A2A7E}" type="datetimeFigureOut">
               <a:rPr lang="en-MX" smtClean="0"/>
-              <a:t>17/08/23</a:t>
+              <a:t>18/08/23</a:t>
             </a:fld>
             <a:endParaRPr lang="en-MX"/>
           </a:p>
@@ -1142,7 +1147,7 @@
           <a:p>
             <a:fld id="{0C661D9C-BB46-1B48-82D6-116B0F1A2A7E}" type="datetimeFigureOut">
               <a:rPr lang="en-MX" smtClean="0"/>
-              <a:t>17/08/23</a:t>
+              <a:t>18/08/23</a:t>
             </a:fld>
             <a:endParaRPr lang="en-MX"/>
           </a:p>
@@ -1410,7 +1415,7 @@
           <a:p>
             <a:fld id="{0C661D9C-BB46-1B48-82D6-116B0F1A2A7E}" type="datetimeFigureOut">
               <a:rPr lang="en-MX" smtClean="0"/>
-              <a:t>17/08/23</a:t>
+              <a:t>18/08/23</a:t>
             </a:fld>
             <a:endParaRPr lang="en-MX"/>
           </a:p>
@@ -1825,7 +1830,7 @@
           <a:p>
             <a:fld id="{0C661D9C-BB46-1B48-82D6-116B0F1A2A7E}" type="datetimeFigureOut">
               <a:rPr lang="en-MX" smtClean="0"/>
-              <a:t>17/08/23</a:t>
+              <a:t>18/08/23</a:t>
             </a:fld>
             <a:endParaRPr lang="en-MX"/>
           </a:p>
@@ -1967,7 +1972,7 @@
           <a:p>
             <a:fld id="{0C661D9C-BB46-1B48-82D6-116B0F1A2A7E}" type="datetimeFigureOut">
               <a:rPr lang="en-MX" smtClean="0"/>
-              <a:t>17/08/23</a:t>
+              <a:t>18/08/23</a:t>
             </a:fld>
             <a:endParaRPr lang="en-MX"/>
           </a:p>
@@ -2080,7 +2085,7 @@
           <a:p>
             <a:fld id="{0C661D9C-BB46-1B48-82D6-116B0F1A2A7E}" type="datetimeFigureOut">
               <a:rPr lang="en-MX" smtClean="0"/>
-              <a:t>17/08/23</a:t>
+              <a:t>18/08/23</a:t>
             </a:fld>
             <a:endParaRPr lang="en-MX"/>
           </a:p>
@@ -2393,7 +2398,7 @@
           <a:p>
             <a:fld id="{0C661D9C-BB46-1B48-82D6-116B0F1A2A7E}" type="datetimeFigureOut">
               <a:rPr lang="en-MX" smtClean="0"/>
-              <a:t>17/08/23</a:t>
+              <a:t>18/08/23</a:t>
             </a:fld>
             <a:endParaRPr lang="en-MX"/>
           </a:p>
@@ -2682,7 +2687,7 @@
           <a:p>
             <a:fld id="{0C661D9C-BB46-1B48-82D6-116B0F1A2A7E}" type="datetimeFigureOut">
               <a:rPr lang="en-MX" smtClean="0"/>
-              <a:t>17/08/23</a:t>
+              <a:t>18/08/23</a:t>
             </a:fld>
             <a:endParaRPr lang="en-MX"/>
           </a:p>
@@ -2925,7 +2930,7 @@
           <a:p>
             <a:fld id="{0C661D9C-BB46-1B48-82D6-116B0F1A2A7E}" type="datetimeFigureOut">
               <a:rPr lang="en-MX" smtClean="0"/>
-              <a:t>17/08/23</a:t>
+              <a:t>18/08/23</a:t>
             </a:fld>
             <a:endParaRPr lang="en-MX"/>
           </a:p>
@@ -3906,6 +3911,195 @@
           </p:txBody>
         </p:sp>
       </p:grpSp>
+      <p:grpSp>
+        <p:nvGrpSpPr>
+          <p:cNvPr id="4" name="Group 3">
+            <a:extLst>
+              <a:ext uri="{FF2B5EF4-FFF2-40B4-BE49-F238E27FC236}">
+                <a16:creationId xmlns:a16="http://schemas.microsoft.com/office/drawing/2014/main" id="{894D615D-6808-C30A-9099-50C854238028}"/>
+              </a:ext>
+            </a:extLst>
+          </p:cNvPr>
+          <p:cNvGrpSpPr/>
+          <p:nvPr/>
+        </p:nvGrpSpPr>
+        <p:grpSpPr>
+          <a:xfrm>
+            <a:off x="7716539" y="544994"/>
+            <a:ext cx="4966900" cy="5768009"/>
+            <a:chOff x="2443658" y="544993"/>
+            <a:chExt cx="4966900" cy="5768009"/>
+          </a:xfrm>
+        </p:grpSpPr>
+        <p:sp>
+          <p:nvSpPr>
+            <p:cNvPr id="5" name="Hexagon 4">
+              <a:extLst>
+                <a:ext uri="{FF2B5EF4-FFF2-40B4-BE49-F238E27FC236}">
+                  <a16:creationId xmlns:a16="http://schemas.microsoft.com/office/drawing/2014/main" id="{F1706128-8909-0FDE-9DFF-7DAC7E4B8362}"/>
+                </a:ext>
+              </a:extLst>
+            </p:cNvPr>
+            <p:cNvSpPr/>
+            <p:nvPr/>
+          </p:nvSpPr>
+          <p:spPr>
+            <a:xfrm rot="5400000">
+              <a:off x="2043103" y="945548"/>
+              <a:ext cx="5768009" cy="4966900"/>
+            </a:xfrm>
+            <a:prstGeom prst="hexagon">
+              <a:avLst>
+                <a:gd name="adj" fmla="val 29487"/>
+                <a:gd name="vf" fmla="val 115470"/>
+              </a:avLst>
+            </a:prstGeom>
+            <a:pattFill prst="pct90">
+              <a:fgClr>
+                <a:srgbClr val="FFC000"/>
+              </a:fgClr>
+              <a:bgClr>
+                <a:schemeClr val="bg1"/>
+              </a:bgClr>
+            </a:pattFill>
+            <a:ln w="28575"/>
+          </p:spPr>
+          <p:style>
+            <a:lnRef idx="2">
+              <a:schemeClr val="accent1">
+                <a:shade val="15000"/>
+              </a:schemeClr>
+            </a:lnRef>
+            <a:fillRef idx="1">
+              <a:schemeClr val="accent1"/>
+            </a:fillRef>
+            <a:effectRef idx="0">
+              <a:schemeClr val="accent1"/>
+            </a:effectRef>
+            <a:fontRef idx="minor">
+              <a:schemeClr val="lt1"/>
+            </a:fontRef>
+          </p:style>
+          <p:txBody>
+            <a:bodyPr rtlCol="0" anchor="ctr"/>
+            <a:lstStyle/>
+            <a:p>
+              <a:pPr algn="ctr"/>
+              <a:endParaRPr lang="en-MX" dirty="0"/>
+            </a:p>
+          </p:txBody>
+        </p:sp>
+        <p:sp>
+          <p:nvSpPr>
+            <p:cNvPr id="8" name="Explosion 2 7">
+              <a:extLst>
+                <a:ext uri="{FF2B5EF4-FFF2-40B4-BE49-F238E27FC236}">
+                  <a16:creationId xmlns:a16="http://schemas.microsoft.com/office/drawing/2014/main" id="{D9067CE2-949C-F39F-603A-85F7B27D77E7}"/>
+                </a:ext>
+              </a:extLst>
+            </p:cNvPr>
+            <p:cNvSpPr/>
+            <p:nvPr/>
+          </p:nvSpPr>
+          <p:spPr>
+            <a:xfrm rot="2362531">
+              <a:off x="3618345" y="1654499"/>
+              <a:ext cx="2822975" cy="3549000"/>
+            </a:xfrm>
+            <a:prstGeom prst="irregularSeal2">
+              <a:avLst/>
+            </a:prstGeom>
+            <a:pattFill prst="pct20">
+              <a:fgClr>
+                <a:srgbClr val="79399D"/>
+              </a:fgClr>
+              <a:bgClr>
+                <a:schemeClr val="bg1"/>
+              </a:bgClr>
+            </a:pattFill>
+            <a:ln w="57150"/>
+            <a:effectLst>
+              <a:outerShdw blurRad="50800" dist="50800" dir="5400000" sx="99230" sy="99230" algn="ctr" rotWithShape="0">
+                <a:srgbClr val="000000">
+                  <a:alpha val="43137"/>
+                </a:srgbClr>
+              </a:outerShdw>
+            </a:effectLst>
+          </p:spPr>
+          <p:style>
+            <a:lnRef idx="2">
+              <a:schemeClr val="accent1">
+                <a:shade val="15000"/>
+              </a:schemeClr>
+            </a:lnRef>
+            <a:fillRef idx="1">
+              <a:schemeClr val="accent1"/>
+            </a:fillRef>
+            <a:effectRef idx="0">
+              <a:schemeClr val="accent1"/>
+            </a:effectRef>
+            <a:fontRef idx="minor">
+              <a:schemeClr val="lt1"/>
+            </a:fontRef>
+          </p:style>
+          <p:txBody>
+            <a:bodyPr rtlCol="0" anchor="ctr"/>
+            <a:lstStyle/>
+            <a:p>
+              <a:pPr algn="ctr"/>
+              <a:endParaRPr lang="en-MX" dirty="0"/>
+            </a:p>
+          </p:txBody>
+        </p:sp>
+        <p:sp>
+          <p:nvSpPr>
+            <p:cNvPr id="9" name="TextBox 8">
+              <a:extLst>
+                <a:ext uri="{FF2B5EF4-FFF2-40B4-BE49-F238E27FC236}">
+                  <a16:creationId xmlns:a16="http://schemas.microsoft.com/office/drawing/2014/main" id="{CE6A9B6A-A5EF-46C2-085F-10E7F117C451}"/>
+                </a:ext>
+              </a:extLst>
+            </p:cNvPr>
+            <p:cNvSpPr txBox="1"/>
+            <p:nvPr/>
+          </p:nvSpPr>
+          <p:spPr>
+            <a:xfrm>
+              <a:off x="3215812" y="2756927"/>
+              <a:ext cx="3284561" cy="1323438"/>
+            </a:xfrm>
+            <a:prstGeom prst="rect">
+              <a:avLst/>
+            </a:prstGeom>
+            <a:noFill/>
+          </p:spPr>
+          <p:txBody>
+            <a:bodyPr wrap="square" rtlCol="0">
+              <a:spAutoFit/>
+            </a:bodyPr>
+            <a:lstStyle/>
+            <a:p>
+              <a:pPr algn="ctr"/>
+              <a:r>
+                <a:rPr lang="en-MX" sz="8000" dirty="0">
+                  <a:solidFill>
+                    <a:srgbClr val="79399D"/>
+                  </a:solidFill>
+                  <a:effectLst>
+                    <a:outerShdw blurRad="50800" dist="50800" dir="5400000" sx="101301" sy="101301" algn="ctr" rotWithShape="0">
+                      <a:srgbClr val="000000">
+                        <a:alpha val="43137"/>
+                      </a:srgbClr>
+                    </a:outerShdw>
+                  </a:effectLst>
+                  <a:latin typeface="Bangers" pitchFamily="2" charset="77"/>
+                </a:rPr>
+                <a:t>PIFPAF</a:t>
+              </a:r>
+            </a:p>
+          </p:txBody>
+        </p:sp>
+      </p:grpSp>
     </p:spTree>
     <p:extLst>
       <p:ext uri="{BB962C8B-B14F-4D97-AF65-F5344CB8AC3E}">

</xml_diff>